<commit_message>
changed project and finalized presentation
</commit_message>
<xml_diff>
--- a/Long Term Unemployment Final Presentation.pptx
+++ b/Long Term Unemployment Final Presentation.pptx
@@ -109,6 +109,11 @@
       </a:defRPr>
     </a:lvl9pPr>
   </p:defaultTextStyle>
+  <p:extLst>
+    <p:ext uri="{EFAFB233-063F-42B5-8137-9DF3F51BA10A}">
+      <p15:sldGuideLst xmlns:p15="http://schemas.microsoft.com/office/powerpoint/2012/main"/>
+    </p:ext>
+  </p:extLst>
 </p:presentation>
 </file>
 
@@ -263,7 +268,7 @@
           <a:p>
             <a:fld id="{1ECB5883-038C-4696-8E27-1811E470D6D4}" type="datetime1">
               <a:rPr lang="en-US" smtClean="0"/>
-              <a:t>3/6/2024</a:t>
+              <a:t>3/7/2024</a:t>
             </a:fld>
             <a:endParaRPr lang="en-US"/>
           </a:p>
@@ -464,7 +469,7 @@
           <a:p>
             <a:fld id="{61E8A6D4-154B-4E4D-9001-7A6C328D243E}" type="datetime1">
               <a:rPr lang="en-US" smtClean="0"/>
-              <a:t>3/6/2024</a:t>
+              <a:t>3/7/2024</a:t>
             </a:fld>
             <a:endParaRPr lang="en-US"/>
           </a:p>
@@ -675,7 +680,7 @@
           <a:p>
             <a:fld id="{EF880999-9BD6-4929-BDEC-B84E21C16701}" type="datetime1">
               <a:rPr lang="en-US" smtClean="0"/>
-              <a:t>3/6/2024</a:t>
+              <a:t>3/7/2024</a:t>
             </a:fld>
             <a:endParaRPr lang="en-US"/>
           </a:p>
@@ -876,7 +881,7 @@
           <a:p>
             <a:fld id="{579F6069-8263-4296-913A-BC2234E8D32B}" type="datetime1">
               <a:rPr lang="en-US" smtClean="0"/>
-              <a:t>3/6/2024</a:t>
+              <a:t>3/7/2024</a:t>
             </a:fld>
             <a:endParaRPr lang="en-US"/>
           </a:p>
@@ -1156,7 +1161,7 @@
           <a:p>
             <a:fld id="{BC9F5005-EC25-4FB9-B19B-2437F0B120D2}" type="datetime1">
               <a:rPr lang="en-US" smtClean="0"/>
-              <a:t>3/6/2024</a:t>
+              <a:t>3/7/2024</a:t>
             </a:fld>
             <a:endParaRPr lang="en-US"/>
           </a:p>
@@ -1424,7 +1429,7 @@
           <a:p>
             <a:fld id="{0B283B5C-2325-42FF-AF91-C1451D9D66CC}" type="datetime1">
               <a:rPr lang="en-US" smtClean="0"/>
-              <a:t>3/6/2024</a:t>
+              <a:t>3/7/2024</a:t>
             </a:fld>
             <a:endParaRPr lang="en-US"/>
           </a:p>
@@ -1843,7 +1848,7 @@
           <a:p>
             <a:fld id="{0F88DB08-3B01-46DD-99F2-F6F6334EA669}" type="datetime1">
               <a:rPr lang="en-US" smtClean="0"/>
-              <a:t>3/6/2024</a:t>
+              <a:t>3/7/2024</a:t>
             </a:fld>
             <a:endParaRPr lang="en-US"/>
           </a:p>
@@ -1987,7 +1992,7 @@
           <a:p>
             <a:fld id="{5892AC11-ACC3-4129-BBD7-C580BF1A4EE7}" type="datetime1">
               <a:rPr lang="en-US" smtClean="0"/>
-              <a:t>3/6/2024</a:t>
+              <a:t>3/7/2024</a:t>
             </a:fld>
             <a:endParaRPr lang="en-US"/>
           </a:p>
@@ -2103,7 +2108,7 @@
           <a:p>
             <a:fld id="{6D80F7F3-E406-44E2-93AF-674B3F1A2E51}" type="datetime1">
               <a:rPr lang="en-US" smtClean="0"/>
-              <a:t>3/6/2024</a:t>
+              <a:t>3/7/2024</a:t>
             </a:fld>
             <a:endParaRPr lang="en-US"/>
           </a:p>
@@ -2421,7 +2426,7 @@
           <a:p>
             <a:fld id="{2FB1DD93-7C9D-4E53-81F0-DDE57FEA7EDB}" type="datetime1">
               <a:rPr lang="en-US" smtClean="0"/>
-              <a:t>3/6/2024</a:t>
+              <a:t>3/7/2024</a:t>
             </a:fld>
             <a:endParaRPr lang="en-US"/>
           </a:p>
@@ -2714,7 +2719,7 @@
           <a:p>
             <a:fld id="{3DF7BC28-59DE-4F83-B4A1-497203279FAD}" type="datetime1">
               <a:rPr lang="en-US" smtClean="0"/>
-              <a:t>3/6/2024</a:t>
+              <a:t>3/7/2024</a:t>
             </a:fld>
             <a:endParaRPr lang="en-US"/>
           </a:p>
@@ -3014,7 +3019,7 @@
           <a:p>
             <a:fld id="{0BDC4764-F656-4735-9820-9886F8DF1D6A}" type="datetime1">
               <a:rPr lang="en-US" smtClean="0"/>
-              <a:t>3/6/2024</a:t>
+              <a:t>3/7/2024</a:t>
             </a:fld>
             <a:endParaRPr lang="en-US" dirty="0"/>
           </a:p>
@@ -3542,12 +3547,12 @@
               </a:lnSpc>
             </a:pPr>
             <a:r>
-              <a:rPr lang="en-US" sz="4500">
+              <a:rPr lang="en-US" sz="4500" dirty="0">
                 <a:solidFill>
                   <a:schemeClr val="bg1"/>
                 </a:solidFill>
               </a:rPr>
-              <a:t>Long Term Unemployment from January 2005 to February 2015</a:t>
+              <a:t>Long Term Unemployment from around The Great Recession</a:t>
             </a:r>
           </a:p>
         </p:txBody>
@@ -3582,7 +3587,7 @@
           <a:p>
             <a:pPr algn="r"/>
             <a:r>
-              <a:rPr lang="en-US">
+              <a:rPr lang="en-US" dirty="0">
                 <a:solidFill>
                   <a:schemeClr val="bg1"/>
                 </a:solidFill>
@@ -9549,7 +9554,7 @@
         <p:spPr>
           <a:xfrm>
             <a:off x="839788" y="807868"/>
-            <a:ext cx="3640713" cy="2062594"/>
+            <a:ext cx="3640713" cy="553572"/>
           </a:xfrm>
         </p:spPr>
         <p:txBody>
@@ -9560,14 +9565,14 @@
           <a:p>
             <a:r>
               <a:rPr lang="en-US" dirty="0"/>
-              <a:t>Men vs Women by Age Group</a:t>
+              <a:t>Men vs Women</a:t>
             </a:r>
           </a:p>
         </p:txBody>
       </p:sp>
       <p:pic>
         <p:nvPicPr>
-          <p:cNvPr id="8" name="Content Placeholder 7" descr="A graph of a graph of employment&#10;&#10;Description automatically generated with medium confidence">
+          <p:cNvPr id="8" name="Content Placeholder 7">
             <a:extLst>
               <a:ext uri="{FF2B5EF4-FFF2-40B4-BE49-F238E27FC236}">
                 <a16:creationId xmlns:a16="http://schemas.microsoft.com/office/drawing/2014/main" id="{3E4FA29B-B173-D16D-D95C-3D4141DCCD41}"/>
@@ -9589,9 +9594,8 @@
               </a:ext>
             </a:extLst>
           </a:blip>
-          <a:stretch>
-            <a:fillRect/>
-          </a:stretch>
+          <a:srcRect/>
+          <a:stretch/>
         </p:blipFill>
         <p:spPr>
           <a:xfrm>
@@ -9619,14 +9623,91 @@
         </p:nvSpPr>
         <p:spPr>
           <a:xfrm>
-            <a:off x="839788" y="3000652"/>
-            <a:ext cx="3640713" cy="2868336"/>
+            <a:off x="839788" y="2407920"/>
+            <a:ext cx="3640713" cy="3461068"/>
           </a:xfrm>
         </p:spPr>
         <p:txBody>
-          <a:bodyPr/>
+          <a:bodyPr>
+            <a:normAutofit fontScale="85000" lnSpcReduction="10000"/>
+          </a:bodyPr>
           <a:lstStyle/>
           <a:p>
+            <a:pPr marL="285750" indent="-285750">
+              <a:buFont typeface="Arial" panose="020B0604020202020204" pitchFamily="34" charset="0"/>
+              <a:buChar char="•"/>
+            </a:pPr>
+            <a:r>
+              <a:rPr lang="en-US" sz="1800" kern="100" dirty="0">
+                <a:effectLst/>
+                <a:latin typeface="Times New Roman" panose="02020603050405020304" pitchFamily="18" charset="0"/>
+                <a:ea typeface="Calibri" panose="020F0502020204030204" pitchFamily="34" charset="0"/>
+                <a:cs typeface="Times New Roman" panose="02020603050405020304" pitchFamily="18" charset="0"/>
+              </a:rPr>
+              <a:t>Unemployment of men and women remained about the same from 2005 till about the end of 2008. </a:t>
+            </a:r>
+          </a:p>
+          <a:p>
+            <a:pPr marL="285750" indent="-285750">
+              <a:buFont typeface="Arial" panose="020B0604020202020204" pitchFamily="34" charset="0"/>
+              <a:buChar char="•"/>
+            </a:pPr>
+            <a:r>
+              <a:rPr lang="en-US" sz="1800" kern="100" dirty="0">
+                <a:effectLst/>
+                <a:latin typeface="Times New Roman" panose="02020603050405020304" pitchFamily="18" charset="0"/>
+                <a:ea typeface="Calibri" panose="020F0502020204030204" pitchFamily="34" charset="0"/>
+                <a:cs typeface="Times New Roman" panose="02020603050405020304" pitchFamily="18" charset="0"/>
+              </a:rPr>
+              <a:t>There was a rise in unemployed men during the great recession (2007-2009</a:t>
+            </a:r>
+            <a:r>
+              <a:rPr lang="en-US" sz="1800" kern="100" dirty="0">
+                <a:latin typeface="Times New Roman" panose="02020603050405020304" pitchFamily="18" charset="0"/>
+                <a:ea typeface="Calibri" panose="020F0502020204030204" pitchFamily="34" charset="0"/>
+                <a:cs typeface="Times New Roman" panose="02020603050405020304" pitchFamily="18" charset="0"/>
+              </a:rPr>
+              <a:t>)</a:t>
+            </a:r>
+            <a:r>
+              <a:rPr lang="en-US" sz="1800" kern="100" dirty="0">
+                <a:effectLst/>
+                <a:latin typeface="Times New Roman" panose="02020603050405020304" pitchFamily="18" charset="0"/>
+                <a:ea typeface="Calibri" panose="020F0502020204030204" pitchFamily="34" charset="0"/>
+                <a:cs typeface="Times New Roman" panose="02020603050405020304" pitchFamily="18" charset="0"/>
+              </a:rPr>
+              <a:t> </a:t>
+            </a:r>
+          </a:p>
+          <a:p>
+            <a:pPr marL="285750" indent="-285750">
+              <a:buFont typeface="Arial" panose="020B0604020202020204" pitchFamily="34" charset="0"/>
+              <a:buChar char="•"/>
+            </a:pPr>
+            <a:r>
+              <a:rPr lang="en-US" sz="1800" kern="100" dirty="0">
+                <a:effectLst/>
+                <a:latin typeface="Times New Roman" panose="02020603050405020304" pitchFamily="18" charset="0"/>
+                <a:ea typeface="Calibri" panose="020F0502020204030204" pitchFamily="34" charset="0"/>
+                <a:cs typeface="Times New Roman" panose="02020603050405020304" pitchFamily="18" charset="0"/>
+              </a:rPr>
+              <a:t>By mid-2008 both men and women were seeing a rise in long term unemployment. </a:t>
+            </a:r>
+          </a:p>
+          <a:p>
+            <a:pPr marL="285750" indent="-285750">
+              <a:buFont typeface="Arial" panose="020B0604020202020204" pitchFamily="34" charset="0"/>
+              <a:buChar char="•"/>
+            </a:pPr>
+            <a:r>
+              <a:rPr lang="en-US" sz="1800" kern="100" dirty="0">
+                <a:effectLst/>
+                <a:latin typeface="Times New Roman" panose="02020603050405020304" pitchFamily="18" charset="0"/>
+                <a:ea typeface="Calibri" panose="020F0502020204030204" pitchFamily="34" charset="0"/>
+                <a:cs typeface="Times New Roman" panose="02020603050405020304" pitchFamily="18" charset="0"/>
+              </a:rPr>
+              <a:t>At this point men were experiencing long term unemployment greater than their female counterparts, peaking in early 2010. </a:t>
+            </a:r>
             <a:endParaRPr lang="en-US" dirty="0"/>
           </a:p>
         </p:txBody>
@@ -9671,7 +9752,7 @@
                   <a:spcPts val="600"/>
                 </a:spcAft>
               </a:pPr>
-              <a:t>3/6/2024</a:t>
+              <a:t>3/7/2024</a:t>
             </a:fld>
             <a:endParaRPr lang="en-US"/>
           </a:p>
@@ -9772,7 +9853,7 @@
         <p:spPr>
           <a:xfrm>
             <a:off x="839788" y="807868"/>
-            <a:ext cx="3640713" cy="2062594"/>
+            <a:ext cx="3640713" cy="685970"/>
           </a:xfrm>
         </p:spPr>
         <p:txBody>
@@ -9783,14 +9864,14 @@
           <a:p>
             <a:r>
               <a:rPr lang="en-US" dirty="0"/>
-              <a:t>Men vs Women over time</a:t>
+              <a:t>Age Groups over time</a:t>
             </a:r>
           </a:p>
         </p:txBody>
       </p:sp>
       <p:pic>
         <p:nvPicPr>
-          <p:cNvPr id="8" name="Content Placeholder 7" descr="A graph of a person and person&#10;&#10;Description automatically generated">
+          <p:cNvPr id="8" name="Content Placeholder 7">
             <a:extLst>
               <a:ext uri="{FF2B5EF4-FFF2-40B4-BE49-F238E27FC236}">
                 <a16:creationId xmlns:a16="http://schemas.microsoft.com/office/drawing/2014/main" id="{82D1397A-AE51-3815-0BBF-9EF7E5AE69AA}"/>
@@ -9812,14 +9893,13 @@
               </a:ext>
             </a:extLst>
           </a:blip>
-          <a:stretch>
-            <a:fillRect/>
-          </a:stretch>
+          <a:srcRect/>
+          <a:stretch/>
         </p:blipFill>
         <p:spPr>
           <a:xfrm>
-            <a:off x="4949255" y="1734207"/>
-            <a:ext cx="6741347" cy="3081277"/>
+            <a:off x="4630923" y="1727378"/>
+            <a:ext cx="7445760" cy="3403244"/>
           </a:xfrm>
           <a:noFill/>
         </p:spPr>
@@ -9842,15 +9922,66 @@
         </p:nvSpPr>
         <p:spPr>
           <a:xfrm>
-            <a:off x="839788" y="3000652"/>
-            <a:ext cx="3640713" cy="2868336"/>
+            <a:off x="839788" y="1981200"/>
+            <a:ext cx="3640713" cy="3887788"/>
           </a:xfrm>
         </p:spPr>
         <p:txBody>
           <a:bodyPr/>
           <a:lstStyle/>
           <a:p>
-            <a:endParaRPr lang="en-US"/>
+            <a:pPr marL="285750" indent="-285750">
+              <a:buFont typeface="Arial" panose="020B0604020202020204" pitchFamily="34" charset="0"/>
+              <a:buChar char="•"/>
+            </a:pPr>
+            <a:r>
+              <a:rPr lang="en-US" sz="1800" kern="100" dirty="0">
+                <a:effectLst/>
+                <a:latin typeface="Times New Roman" panose="02020603050405020304" pitchFamily="18" charset="0"/>
+                <a:ea typeface="Calibri" panose="020F0502020204030204" pitchFamily="34" charset="0"/>
+                <a:cs typeface="Times New Roman" panose="02020603050405020304" pitchFamily="18" charset="0"/>
+              </a:rPr>
+              <a:t>Teenagers and people of retirement age and older are the least unemployed without much change after the great recession. </a:t>
+            </a:r>
+          </a:p>
+          <a:p>
+            <a:pPr marL="285750" indent="-285750">
+              <a:buFont typeface="Arial" panose="020B0604020202020204" pitchFamily="34" charset="0"/>
+              <a:buChar char="•"/>
+            </a:pPr>
+            <a:r>
+              <a:rPr lang="en-US" sz="1800" kern="100" dirty="0">
+                <a:effectLst/>
+                <a:latin typeface="Times New Roman" panose="02020603050405020304" pitchFamily="18" charset="0"/>
+                <a:ea typeface="Calibri" panose="020F0502020204030204" pitchFamily="34" charset="0"/>
+                <a:cs typeface="Times New Roman" panose="02020603050405020304" pitchFamily="18" charset="0"/>
+              </a:rPr>
+              <a:t>People between the ages of 25 and 54 were the most unemployed of all age groups. </a:t>
+            </a:r>
+          </a:p>
+          <a:p>
+            <a:pPr marL="285750" indent="-285750">
+              <a:buFont typeface="Arial" panose="020B0604020202020204" pitchFamily="34" charset="0"/>
+              <a:buChar char="•"/>
+            </a:pPr>
+            <a:r>
+              <a:rPr lang="en-US" sz="1800" kern="100" dirty="0">
+                <a:effectLst/>
+                <a:latin typeface="Times New Roman" panose="02020603050405020304" pitchFamily="18" charset="0"/>
+                <a:ea typeface="Calibri" panose="020F0502020204030204" pitchFamily="34" charset="0"/>
+                <a:cs typeface="Times New Roman" panose="02020603050405020304" pitchFamily="18" charset="0"/>
+              </a:rPr>
+              <a:t>They saw a large uptick in unemployment from the recession peaking in early 2010.</a:t>
+            </a:r>
+            <a:endParaRPr lang="en-US" sz="1800" kern="100" dirty="0">
+              <a:effectLst/>
+              <a:latin typeface="Calibri" panose="020F0502020204030204" pitchFamily="34" charset="0"/>
+              <a:ea typeface="Calibri" panose="020F0502020204030204" pitchFamily="34" charset="0"/>
+              <a:cs typeface="Times New Roman" panose="02020603050405020304" pitchFamily="18" charset="0"/>
+            </a:endParaRPr>
+          </a:p>
+          <a:p>
+            <a:endParaRPr lang="en-US" dirty="0"/>
           </a:p>
         </p:txBody>
       </p:sp>
@@ -9894,7 +10025,7 @@
                   <a:spcPts val="600"/>
                 </a:spcAft>
               </a:pPr>
-              <a:t>3/6/2024</a:t>
+              <a:t>3/7/2024</a:t>
             </a:fld>
             <a:endParaRPr lang="en-US"/>
           </a:p>
@@ -10069,10 +10200,47 @@
           </a:xfrm>
         </p:spPr>
         <p:txBody>
-          <a:bodyPr/>
+          <a:bodyPr>
+            <a:normAutofit fontScale="92500" lnSpcReduction="20000"/>
+          </a:bodyPr>
           <a:lstStyle/>
           <a:p>
-            <a:endParaRPr lang="en-US"/>
+            <a:pPr marL="285750" indent="-285750">
+              <a:buFont typeface="Arial" panose="020B0604020202020204" pitchFamily="34" charset="0"/>
+              <a:buChar char="•"/>
+            </a:pPr>
+            <a:r>
+              <a:rPr lang="en-US" sz="1800" dirty="0">
+                <a:effectLst/>
+                <a:latin typeface="Times New Roman" panose="02020603050405020304" pitchFamily="18" charset="0"/>
+                <a:ea typeface="Calibri" panose="020F0502020204030204" pitchFamily="34" charset="0"/>
+              </a:rPr>
+              <a:t>Men had a higher number of unemployment overall, with maximums reaching one-million, while women capped out around 750K. </a:t>
+            </a:r>
+          </a:p>
+          <a:p>
+            <a:pPr marL="285750" indent="-285750">
+              <a:buFont typeface="Arial" panose="020B0604020202020204" pitchFamily="34" charset="0"/>
+              <a:buChar char="•"/>
+            </a:pPr>
+            <a:r>
+              <a:rPr lang="en-US" sz="1800" kern="100" dirty="0">
+                <a:effectLst/>
+                <a:latin typeface="Times New Roman" panose="02020603050405020304" pitchFamily="18" charset="0"/>
+                <a:ea typeface="Calibri" panose="020F0502020204030204" pitchFamily="34" charset="0"/>
+                <a:cs typeface="Times New Roman" panose="02020603050405020304" pitchFamily="18" charset="0"/>
+              </a:rPr>
+              <a:t>In both genders the most unemployment was seen in ages 25-54 from September 2008 to mid 2013, while those aged 25-34 had the slowest recovery.</a:t>
+            </a:r>
+            <a:endParaRPr lang="en-US" sz="1800" kern="100" dirty="0">
+              <a:effectLst/>
+              <a:latin typeface="Calibri" panose="020F0502020204030204" pitchFamily="34" charset="0"/>
+              <a:ea typeface="Calibri" panose="020F0502020204030204" pitchFamily="34" charset="0"/>
+              <a:cs typeface="Times New Roman" panose="02020603050405020304" pitchFamily="18" charset="0"/>
+            </a:endParaRPr>
+          </a:p>
+          <a:p>
+            <a:endParaRPr lang="en-US" dirty="0"/>
           </a:p>
         </p:txBody>
       </p:sp>
@@ -10116,9 +10284,9 @@
                   <a:spcPts val="600"/>
                 </a:spcAft>
               </a:pPr>
-              <a:t>3/6/2024</a:t>
+              <a:t>3/7/2024</a:t>
             </a:fld>
-            <a:endParaRPr lang="en-US"/>
+            <a:endParaRPr lang="en-US" dirty="0"/>
           </a:p>
         </p:txBody>
       </p:sp>
@@ -10247,7 +10415,87 @@
           <a:bodyPr/>
           <a:lstStyle/>
           <a:p>
-            <a:endParaRPr lang="en-US"/>
+            <a:r>
+              <a:rPr lang="en-US" sz="1800" kern="100" dirty="0">
+                <a:effectLst/>
+                <a:latin typeface="Times New Roman" panose="02020603050405020304" pitchFamily="18" charset="0"/>
+                <a:ea typeface="Calibri" panose="020F0502020204030204" pitchFamily="34" charset="0"/>
+                <a:cs typeface="Times New Roman" panose="02020603050405020304" pitchFamily="18" charset="0"/>
+              </a:rPr>
+              <a:t>The great recession was a challenging time for everyone in the workforce. </a:t>
+            </a:r>
+          </a:p>
+          <a:p>
+            <a:r>
+              <a:rPr lang="en-US" sz="1800" kern="100" dirty="0">
+                <a:effectLst/>
+                <a:latin typeface="Times New Roman" panose="02020603050405020304" pitchFamily="18" charset="0"/>
+                <a:ea typeface="Calibri" panose="020F0502020204030204" pitchFamily="34" charset="0"/>
+                <a:cs typeface="Times New Roman" panose="02020603050405020304" pitchFamily="18" charset="0"/>
+              </a:rPr>
+              <a:t>What we don’t know is how many people were in the workforce to begin with. </a:t>
+            </a:r>
+          </a:p>
+          <a:p>
+            <a:pPr lvl="1"/>
+            <a:r>
+              <a:rPr lang="en-US" sz="1600" kern="100" dirty="0">
+                <a:latin typeface="Times New Roman" panose="02020603050405020304" pitchFamily="18" charset="0"/>
+                <a:ea typeface="Calibri" panose="020F0502020204030204" pitchFamily="34" charset="0"/>
+                <a:cs typeface="Times New Roman" panose="02020603050405020304" pitchFamily="18" charset="0"/>
+              </a:rPr>
+              <a:t>D</a:t>
+            </a:r>
+            <a:r>
+              <a:rPr lang="en-US" sz="1600" kern="100" dirty="0">
+                <a:effectLst/>
+                <a:latin typeface="Times New Roman" panose="02020603050405020304" pitchFamily="18" charset="0"/>
+                <a:ea typeface="Calibri" panose="020F0502020204030204" pitchFamily="34" charset="0"/>
+                <a:cs typeface="Times New Roman" panose="02020603050405020304" pitchFamily="18" charset="0"/>
+              </a:rPr>
+              <a:t>id women have smaller unemployment overall because there were less women in the workforce? </a:t>
+            </a:r>
+          </a:p>
+          <a:p>
+            <a:pPr lvl="1"/>
+            <a:r>
+              <a:rPr lang="en-US" sz="1600" kern="100" dirty="0">
+                <a:effectLst/>
+                <a:latin typeface="Times New Roman" panose="02020603050405020304" pitchFamily="18" charset="0"/>
+                <a:ea typeface="Calibri" panose="020F0502020204030204" pitchFamily="34" charset="0"/>
+                <a:cs typeface="Times New Roman" panose="02020603050405020304" pitchFamily="18" charset="0"/>
+              </a:rPr>
+              <a:t>Are there social reasons for men having larger unemployment numbers? </a:t>
+            </a:r>
+          </a:p>
+          <a:p>
+            <a:r>
+              <a:rPr lang="en-US" sz="2000" dirty="0">
+                <a:effectLst/>
+                <a:latin typeface="Times New Roman" panose="02020603050405020304" pitchFamily="18" charset="0"/>
+                <a:ea typeface="Calibri" panose="020F0502020204030204" pitchFamily="34" charset="0"/>
+              </a:rPr>
+              <a:t>Teenagers and people of retirement age and older are the least unemployed without much change after the great recession. They have the least number of people in the work force. </a:t>
+            </a:r>
+          </a:p>
+          <a:p>
+            <a:r>
+              <a:rPr lang="en-US" sz="2000" dirty="0">
+                <a:effectLst/>
+                <a:latin typeface="Times New Roman" panose="02020603050405020304" pitchFamily="18" charset="0"/>
+                <a:ea typeface="Calibri" panose="020F0502020204030204" pitchFamily="34" charset="0"/>
+              </a:rPr>
+              <a:t>People between the ages of 25 and 54 were the most unemployed of all age groups. </a:t>
+            </a:r>
+            <a:endParaRPr lang="en-US" sz="1800" kern="100" dirty="0">
+              <a:effectLst/>
+              <a:latin typeface="Calibri" panose="020F0502020204030204" pitchFamily="34" charset="0"/>
+              <a:ea typeface="Calibri" panose="020F0502020204030204" pitchFamily="34" charset="0"/>
+              <a:cs typeface="Times New Roman" panose="02020603050405020304" pitchFamily="18" charset="0"/>
+            </a:endParaRPr>
+          </a:p>
+          <a:p>
+            <a:endParaRPr lang="en-US" dirty="0"/>
           </a:p>
         </p:txBody>
       </p:sp>
@@ -10274,7 +10522,7 @@
           <a:p>
             <a:fld id="{579F6069-8263-4296-913A-BC2234E8D32B}" type="datetime1">
               <a:rPr lang="en-US" smtClean="0"/>
-              <a:t>3/6/2024</a:t>
+              <a:t>3/7/2024</a:t>
             </a:fld>
             <a:endParaRPr lang="en-US"/>
           </a:p>
@@ -10416,7 +10664,30 @@
           <a:bodyPr/>
           <a:lstStyle/>
           <a:p>
-            <a:endParaRPr lang="en-US"/>
+            <a:r>
+              <a:rPr lang="en-US" dirty="0">
+                <a:effectLst/>
+              </a:rPr>
+              <a:t>Weinberg, J. (2013, November 22). </a:t>
+            </a:r>
+            <a:r>
+              <a:rPr lang="en-US" i="1" dirty="0">
+                <a:effectLst/>
+              </a:rPr>
+              <a:t>The great recession and its aftermath</a:t>
+            </a:r>
+            <a:r>
+              <a:rPr lang="en-US" dirty="0">
+                <a:effectLst/>
+              </a:rPr>
+              <a:t>. Federal Reserve History. https://www.federalreservehistory.org/essays/great-recession-and-its-aftermath </a:t>
+            </a:r>
+          </a:p>
+          <a:p>
+            <a:pPr marL="0" indent="0">
+              <a:buNone/>
+            </a:pPr>
+            <a:endParaRPr lang="en-US" dirty="0"/>
           </a:p>
         </p:txBody>
       </p:sp>
@@ -10443,7 +10714,7 @@
           <a:p>
             <a:fld id="{579F6069-8263-4296-913A-BC2234E8D32B}" type="datetime1">
               <a:rPr lang="en-US" smtClean="0"/>
-              <a:t>3/6/2024</a:t>
+              <a:t>3/7/2024</a:t>
             </a:fld>
             <a:endParaRPr lang="en-US"/>
           </a:p>

</xml_diff>